<commit_message>
Corrections sur le jeu. Le deplacement des joueurs au demarrage a l'air de jouer (controllerReseau a NULL). Le ControllerGame et modelGame maintenant creer a chaque debut de partie. Il faut juste tuer les thread a la fin de la partie.
</commit_message>
<xml_diff>
--- a/Documentation/presentation.pptx
+++ b/Documentation/presentation.pptx
@@ -365,7 +365,8 @@
           <a:p>
             <a:fld id="{4A640E62-3FA3-431E-88CE-8557D458FA1E}" type="datetimeFigureOut">
               <a:rPr lang="it-CH" smtClean="0"/>
-              <a:t>03.06.2010</a:t>
+              <a:pPr/>
+              <a:t>07.06.2010</a:t>
             </a:fld>
             <a:endParaRPr lang="it-CH"/>
           </a:p>
@@ -407,6 +408,7 @@
           <a:p>
             <a:fld id="{2A040678-3833-4170-8A22-528EF1F96AE5}" type="slidenum">
               <a:rPr lang="it-CH" smtClean="0"/>
+              <a:pPr/>
               <a:t>‹N°›</a:t>
             </a:fld>
             <a:endParaRPr lang="it-CH"/>
@@ -588,7 +590,8 @@
           <a:p>
             <a:fld id="{4A640E62-3FA3-431E-88CE-8557D458FA1E}" type="datetimeFigureOut">
               <a:rPr lang="it-CH" smtClean="0"/>
-              <a:t>03.06.2010</a:t>
+              <a:pPr/>
+              <a:t>07.06.2010</a:t>
             </a:fld>
             <a:endParaRPr lang="it-CH"/>
           </a:p>
@@ -630,6 +633,7 @@
           <a:p>
             <a:fld id="{2A040678-3833-4170-8A22-528EF1F96AE5}" type="slidenum">
               <a:rPr lang="it-CH" smtClean="0"/>
+              <a:pPr/>
               <a:t>‹N°›</a:t>
             </a:fld>
             <a:endParaRPr lang="it-CH"/>
@@ -868,7 +872,8 @@
           <a:p>
             <a:fld id="{4A640E62-3FA3-431E-88CE-8557D458FA1E}" type="datetimeFigureOut">
               <a:rPr lang="it-CH" smtClean="0"/>
-              <a:t>03.06.2010</a:t>
+              <a:pPr/>
+              <a:t>07.06.2010</a:t>
             </a:fld>
             <a:endParaRPr lang="it-CH"/>
           </a:p>
@@ -915,6 +920,7 @@
           <a:p>
             <a:fld id="{2A040678-3833-4170-8A22-528EF1F96AE5}" type="slidenum">
               <a:rPr lang="it-CH" smtClean="0"/>
+              <a:pPr/>
               <a:t>‹N°›</a:t>
             </a:fld>
             <a:endParaRPr lang="it-CH"/>
@@ -1047,7 +1053,8 @@
           <a:p>
             <a:fld id="{4A640E62-3FA3-431E-88CE-8557D458FA1E}" type="datetimeFigureOut">
               <a:rPr lang="it-CH" smtClean="0"/>
-              <a:t>03.06.2010</a:t>
+              <a:pPr/>
+              <a:t>07.06.2010</a:t>
             </a:fld>
             <a:endParaRPr lang="it-CH"/>
           </a:p>
@@ -1089,6 +1096,7 @@
           <a:p>
             <a:fld id="{2A040678-3833-4170-8A22-528EF1F96AE5}" type="slidenum">
               <a:rPr lang="it-CH" smtClean="0"/>
+              <a:pPr/>
               <a:t>‹N°›</a:t>
             </a:fld>
             <a:endParaRPr lang="it-CH"/>
@@ -1405,7 +1413,8 @@
           <a:p>
             <a:fld id="{4A640E62-3FA3-431E-88CE-8557D458FA1E}" type="datetimeFigureOut">
               <a:rPr lang="it-CH" smtClean="0"/>
-              <a:t>03.06.2010</a:t>
+              <a:pPr/>
+              <a:t>07.06.2010</a:t>
             </a:fld>
             <a:endParaRPr lang="it-CH"/>
           </a:p>
@@ -1447,6 +1456,7 @@
           <a:p>
             <a:fld id="{2A040678-3833-4170-8A22-528EF1F96AE5}" type="slidenum">
               <a:rPr lang="it-CH" smtClean="0"/>
+              <a:pPr/>
               <a:t>‹N°›</a:t>
             </a:fld>
             <a:endParaRPr lang="it-CH"/>
@@ -1692,7 +1702,8 @@
           <a:p>
             <a:fld id="{4A640E62-3FA3-431E-88CE-8557D458FA1E}" type="datetimeFigureOut">
               <a:rPr lang="it-CH" smtClean="0"/>
-              <a:t>03.06.2010</a:t>
+              <a:pPr/>
+              <a:t>07.06.2010</a:t>
             </a:fld>
             <a:endParaRPr lang="it-CH"/>
           </a:p>
@@ -1734,6 +1745,7 @@
           <a:p>
             <a:fld id="{2A040678-3833-4170-8A22-528EF1F96AE5}" type="slidenum">
               <a:rPr lang="it-CH" smtClean="0"/>
+              <a:pPr/>
               <a:t>‹N°›</a:t>
             </a:fld>
             <a:endParaRPr lang="it-CH"/>
@@ -2114,7 +2126,8 @@
           <a:p>
             <a:fld id="{4A640E62-3FA3-431E-88CE-8557D458FA1E}" type="datetimeFigureOut">
               <a:rPr lang="it-CH" smtClean="0"/>
-              <a:t>03.06.2010</a:t>
+              <a:pPr/>
+              <a:t>07.06.2010</a:t>
             </a:fld>
             <a:endParaRPr lang="it-CH"/>
           </a:p>
@@ -2156,6 +2169,7 @@
           <a:p>
             <a:fld id="{2A040678-3833-4170-8A22-528EF1F96AE5}" type="slidenum">
               <a:rPr lang="it-CH" smtClean="0"/>
+              <a:pPr/>
               <a:t>‹N°›</a:t>
             </a:fld>
             <a:endParaRPr lang="it-CH"/>
@@ -2229,7 +2243,8 @@
           <a:p>
             <a:fld id="{4A640E62-3FA3-431E-88CE-8557D458FA1E}" type="datetimeFigureOut">
               <a:rPr lang="it-CH" smtClean="0"/>
-              <a:t>03.06.2010</a:t>
+              <a:pPr/>
+              <a:t>07.06.2010</a:t>
             </a:fld>
             <a:endParaRPr lang="it-CH"/>
           </a:p>
@@ -2271,6 +2286,7 @@
           <a:p>
             <a:fld id="{2A040678-3833-4170-8A22-528EF1F96AE5}" type="slidenum">
               <a:rPr lang="it-CH" smtClean="0"/>
+              <a:pPr/>
               <a:t>‹N°›</a:t>
             </a:fld>
             <a:endParaRPr lang="it-CH"/>
@@ -2319,7 +2335,8 @@
           <a:p>
             <a:fld id="{4A640E62-3FA3-431E-88CE-8557D458FA1E}" type="datetimeFigureOut">
               <a:rPr lang="it-CH" smtClean="0"/>
-              <a:t>03.06.2010</a:t>
+              <a:pPr/>
+              <a:t>07.06.2010</a:t>
             </a:fld>
             <a:endParaRPr lang="it-CH"/>
           </a:p>
@@ -2361,6 +2378,7 @@
           <a:p>
             <a:fld id="{2A040678-3833-4170-8A22-528EF1F96AE5}" type="slidenum">
               <a:rPr lang="it-CH" smtClean="0"/>
+              <a:pPr/>
               <a:t>‹N°›</a:t>
             </a:fld>
             <a:endParaRPr lang="it-CH"/>
@@ -2597,7 +2615,8 @@
           <a:p>
             <a:fld id="{4A640E62-3FA3-431E-88CE-8557D458FA1E}" type="datetimeFigureOut">
               <a:rPr lang="it-CH" smtClean="0"/>
-              <a:t>03.06.2010</a:t>
+              <a:pPr/>
+              <a:t>07.06.2010</a:t>
             </a:fld>
             <a:endParaRPr lang="it-CH"/>
           </a:p>
@@ -2639,6 +2658,7 @@
           <a:p>
             <a:fld id="{2A040678-3833-4170-8A22-528EF1F96AE5}" type="slidenum">
               <a:rPr lang="it-CH" smtClean="0"/>
+              <a:pPr/>
               <a:t>‹N°›</a:t>
             </a:fld>
             <a:endParaRPr lang="it-CH"/>
@@ -2963,7 +2983,8 @@
           <a:p>
             <a:fld id="{4A640E62-3FA3-431E-88CE-8557D458FA1E}" type="datetimeFigureOut">
               <a:rPr lang="it-CH" smtClean="0"/>
-              <a:t>03.06.2010</a:t>
+              <a:pPr/>
+              <a:t>07.06.2010</a:t>
             </a:fld>
             <a:endParaRPr lang="it-CH"/>
           </a:p>
@@ -3119,6 +3140,7 @@
           <a:p>
             <a:fld id="{2A040678-3833-4170-8A22-528EF1F96AE5}" type="slidenum">
               <a:rPr lang="it-CH" smtClean="0"/>
+              <a:pPr/>
               <a:t>‹N°›</a:t>
             </a:fld>
             <a:endParaRPr lang="it-CH"/>
@@ -3400,7 +3422,8 @@
           <a:p>
             <a:fld id="{4A640E62-3FA3-431E-88CE-8557D458FA1E}" type="datetimeFigureOut">
               <a:rPr lang="it-CH" smtClean="0"/>
-              <a:t>03.06.2010</a:t>
+              <a:pPr/>
+              <a:t>07.06.2010</a:t>
             </a:fld>
             <a:endParaRPr lang="it-CH"/>
           </a:p>
@@ -3480,6 +3503,7 @@
           <a:p>
             <a:fld id="{2A040678-3833-4170-8A22-528EF1F96AE5}" type="slidenum">
               <a:rPr lang="it-CH" smtClean="0"/>
+              <a:pPr/>
               <a:t>‹N°›</a:t>
             </a:fld>
             <a:endParaRPr lang="it-CH"/>
@@ -3876,28 +3900,56 @@
             </a:br>
             <a:r>
               <a:rPr lang="it-CH" dirty="0" smtClean="0"/>
-              <a:t>Berdoz Jonas</a:t>
+              <a:t> Jonas </a:t>
+            </a:r>
+            <a:r>
+              <a:rPr lang="it-CH" dirty="0" smtClean="0"/>
+              <a:t>Berdoz</a:t>
+            </a:r>
+            <a:r>
+              <a:rPr lang="it-CH" dirty="0" smtClean="0"/>
+              <a:t/>
             </a:r>
             <a:br>
               <a:rPr lang="it-CH" dirty="0" smtClean="0"/>
             </a:br>
             <a:r>
               <a:rPr lang="it-CH" dirty="0" smtClean="0"/>
-              <a:t>Beretta Piccoli Fabrizio</a:t>
+              <a:t>Fabrizio Beretta </a:t>
+            </a:r>
+            <a:r>
+              <a:rPr lang="it-CH" dirty="0" smtClean="0"/>
+              <a:t>Piccoli</a:t>
+            </a:r>
+            <a:r>
+              <a:rPr lang="it-CH" dirty="0" smtClean="0"/>
+              <a:t/>
             </a:r>
             <a:br>
               <a:rPr lang="it-CH" dirty="0" smtClean="0"/>
             </a:br>
             <a:r>
               <a:rPr lang="it-CH" dirty="0" smtClean="0"/>
-              <a:t>Delaye Valentin</a:t>
+              <a:t>Valentin Delaye </a:t>
+            </a:r>
+            <a:r>
+              <a:rPr lang="it-CH" dirty="0" smtClean="0"/>
+              <a:t/>
             </a:r>
             <a:br>
               <a:rPr lang="it-CH" dirty="0" smtClean="0"/>
             </a:br>
             <a:r>
               <a:rPr lang="it-CH" dirty="0" smtClean="0"/>
-              <a:t>Sandoz Michael</a:t>
+              <a:t>Michaël </a:t>
+            </a:r>
+            <a:r>
+              <a:rPr lang="it-CH" dirty="0" smtClean="0"/>
+              <a:t>Sandoz </a:t>
+            </a:r>
+            <a:r>
+              <a:rPr lang="it-CH" dirty="0" smtClean="0"/>
+              <a:t/>
             </a:r>
             <a:br>
               <a:rPr lang="it-CH" dirty="0" smtClean="0"/>
@@ -4184,14 +4236,19 @@
           <a:p>
             <a:r>
               <a:rPr lang="it-CH" dirty="0" smtClean="0"/>
-              <a:t>Regles du jeu</a:t>
-            </a:r>
-          </a:p>
-          <a:p>
+              <a:t>Règles </a:t>
+            </a:r>
             <a:r>
               <a:rPr lang="it-CH" dirty="0" smtClean="0"/>
-              <a:t>Démo</a:t>
-            </a:r>
+              <a:t>du jeu</a:t>
+            </a:r>
+          </a:p>
+          <a:p>
+            <a:r>
+              <a:rPr lang="it-CH" dirty="0" smtClean="0"/>
+              <a:t>Démonstration</a:t>
+            </a:r>
+            <a:endParaRPr lang="it-CH" dirty="0" smtClean="0"/>
           </a:p>
           <a:p>
             <a:r>
@@ -4220,7 +4277,7 @@
           <a:p>
             <a:r>
               <a:rPr lang="it-CH" dirty="0" smtClean="0"/>
-              <a:t>Questions?</a:t>
+              <a:t>Questions ?</a:t>
             </a:r>
             <a:endParaRPr lang="it-CH" dirty="0"/>
           </a:p>
@@ -4298,26 +4355,28 @@
           <a:p>
             <a:r>
               <a:rPr lang="it-CH" dirty="0" smtClean="0"/>
-              <a:t>Creer un joue de tir 2D</a:t>
-            </a:r>
-          </a:p>
-          <a:p>
+              <a:t>Creer un </a:t>
+            </a:r>
+            <a:r>
+              <a:rPr lang="it-CH" dirty="0" smtClean="0"/>
+              <a:t>jeu de combat en 2D</a:t>
+            </a:r>
             <a:endParaRPr lang="it-CH" dirty="0" smtClean="0"/>
           </a:p>
           <a:p>
+            <a:endParaRPr lang="it-CH" dirty="0" smtClean="0"/>
+          </a:p>
+          <a:p>
             <a:r>
               <a:rPr lang="it-CH" dirty="0" smtClean="0"/>
-              <a:t>Jouable en reseau</a:t>
-            </a:r>
-          </a:p>
-          <a:p>
+              <a:t>Jouable de 2 à 8 joueurs en réseau</a:t>
+            </a:r>
             <a:endParaRPr lang="it-CH" dirty="0" smtClean="0"/>
           </a:p>
           <a:p>
-            <a:r>
-              <a:rPr lang="it-CH" dirty="0" smtClean="0"/>
-              <a:t>Le </a:t>
-            </a:r>
+            <a:endParaRPr lang="it-CH" dirty="0" smtClean="0"/>
+          </a:p>
+          <a:p>
             <a:endParaRPr lang="it-CH" dirty="0"/>
           </a:p>
         </p:txBody>
@@ -4730,21 +4789,10 @@
           </a:p>
           <a:p>
             <a:r>
-              <a:rPr lang="it-CH" dirty="0" smtClean="0"/>
-              <a:t>Different sort de </a:t>
-            </a:r>
-            <a:r>
-              <a:rPr lang="fr-FR" dirty="0" err="1" smtClean="0"/>
-              <a:t>JPanel</a:t>
-            </a:r>
-            <a:r>
-              <a:rPr lang="it-CH" dirty="0" smtClean="0"/>
-              <a:t>  </a:t>
-            </a:r>
-            <a:r>
-              <a:rPr lang="fr-FR" dirty="0" smtClean="0"/>
-              <a:t>interchangeables</a:t>
-            </a:r>
+              <a:rPr lang="fr-CH" dirty="0" smtClean="0"/>
+              <a:t>Différents panels pour le contenu</a:t>
+            </a:r>
+            <a:endParaRPr lang="fr-FR" dirty="0" smtClean="0"/>
           </a:p>
           <a:p>
             <a:endParaRPr lang="fr-FR" dirty="0" smtClean="0"/>

</xml_diff>

<commit_message>
Partie rapport UML + diagramme activité + séquence. Intégration partie Berdoz sur PPT. A relire et a corriger
</commit_message>
<xml_diff>
--- a/Documentation/presentation.pptx
+++ b/Documentation/presentation.pptx
@@ -16,12 +16,16 @@
     <p:sldId id="270" r:id="rId10"/>
     <p:sldId id="273" r:id="rId11"/>
     <p:sldId id="272" r:id="rId12"/>
-    <p:sldId id="275" r:id="rId13"/>
-    <p:sldId id="276" r:id="rId14"/>
-    <p:sldId id="277" r:id="rId15"/>
-    <p:sldId id="278" r:id="rId16"/>
-    <p:sldId id="269" r:id="rId17"/>
-    <p:sldId id="258" r:id="rId18"/>
+    <p:sldId id="279" r:id="rId13"/>
+    <p:sldId id="280" r:id="rId14"/>
+    <p:sldId id="281" r:id="rId15"/>
+    <p:sldId id="282" r:id="rId16"/>
+    <p:sldId id="283" r:id="rId17"/>
+    <p:sldId id="284" r:id="rId18"/>
+    <p:sldId id="277" r:id="rId19"/>
+    <p:sldId id="278" r:id="rId20"/>
+    <p:sldId id="269" r:id="rId21"/>
+    <p:sldId id="258" r:id="rId22"/>
   </p:sldIdLst>
   <p:sldSz cx="9144000" cy="6858000" type="screen4x3"/>
   <p:notesSz cx="6858000" cy="9144000"/>
@@ -258,7 +262,7 @@
             <a:fld id="{4A640E62-3FA3-431E-88CE-8557D458FA1E}" type="datetimeFigureOut">
               <a:rPr lang="it-CH" smtClean="0"/>
               <a:pPr/>
-              <a:t>10.06.2010</a:t>
+              <a:t>11.06.2010</a:t>
             </a:fld>
             <a:endParaRPr lang="it-CH"/>
           </a:p>
@@ -576,7 +580,7 @@
             <a:fld id="{4A640E62-3FA3-431E-88CE-8557D458FA1E}" type="datetimeFigureOut">
               <a:rPr lang="it-CH" smtClean="0"/>
               <a:pPr/>
-              <a:t>10.06.2010</a:t>
+              <a:t>11.06.2010</a:t>
             </a:fld>
             <a:endParaRPr lang="it-CH"/>
           </a:p>
@@ -766,7 +770,7 @@
             <a:fld id="{4A640E62-3FA3-431E-88CE-8557D458FA1E}" type="datetimeFigureOut">
               <a:rPr lang="it-CH" smtClean="0"/>
               <a:pPr/>
-              <a:t>10.06.2010</a:t>
+              <a:t>11.06.2010</a:t>
             </a:fld>
             <a:endParaRPr lang="it-CH"/>
           </a:p>
@@ -946,7 +950,7 @@
             <a:fld id="{4A640E62-3FA3-431E-88CE-8557D458FA1E}" type="datetimeFigureOut">
               <a:rPr lang="it-CH" smtClean="0"/>
               <a:pPr/>
-              <a:t>10.06.2010</a:t>
+              <a:t>11.06.2010</a:t>
             </a:fld>
             <a:endParaRPr lang="it-CH"/>
           </a:p>
@@ -1219,7 +1223,7 @@
             <a:fld id="{4A640E62-3FA3-431E-88CE-8557D458FA1E}" type="datetimeFigureOut">
               <a:rPr lang="it-CH" smtClean="0"/>
               <a:pPr/>
-              <a:t>10.06.2010</a:t>
+              <a:t>11.06.2010</a:t>
             </a:fld>
             <a:endParaRPr lang="it-CH"/>
           </a:p>
@@ -1692,7 +1696,7 @@
             <a:fld id="{4A640E62-3FA3-431E-88CE-8557D458FA1E}" type="datetimeFigureOut">
               <a:rPr lang="it-CH" smtClean="0"/>
               <a:pPr/>
-              <a:t>10.06.2010</a:t>
+              <a:t>11.06.2010</a:t>
             </a:fld>
             <a:endParaRPr lang="it-CH"/>
           </a:p>
@@ -2186,7 +2190,7 @@
             <a:fld id="{4A640E62-3FA3-431E-88CE-8557D458FA1E}" type="datetimeFigureOut">
               <a:rPr lang="it-CH" smtClean="0"/>
               <a:pPr/>
-              <a:t>10.06.2010</a:t>
+              <a:t>11.06.2010</a:t>
             </a:fld>
             <a:endParaRPr lang="it-CH"/>
           </a:p>
@@ -2317,7 +2321,7 @@
             <a:fld id="{4A640E62-3FA3-431E-88CE-8557D458FA1E}" type="datetimeFigureOut">
               <a:rPr lang="it-CH" smtClean="0"/>
               <a:pPr/>
-              <a:t>10.06.2010</a:t>
+              <a:t>11.06.2010</a:t>
             </a:fld>
             <a:endParaRPr lang="it-CH"/>
           </a:p>
@@ -2466,7 +2470,7 @@
             <a:fld id="{4A640E62-3FA3-431E-88CE-8557D458FA1E}" type="datetimeFigureOut">
               <a:rPr lang="it-CH" smtClean="0"/>
               <a:pPr/>
-              <a:t>10.06.2010</a:t>
+              <a:t>11.06.2010</a:t>
             </a:fld>
             <a:endParaRPr lang="it-CH"/>
           </a:p>
@@ -2793,7 +2797,7 @@
             <a:fld id="{4A640E62-3FA3-431E-88CE-8557D458FA1E}" type="datetimeFigureOut">
               <a:rPr lang="it-CH" smtClean="0"/>
               <a:pPr/>
-              <a:t>10.06.2010</a:t>
+              <a:t>11.06.2010</a:t>
             </a:fld>
             <a:endParaRPr lang="it-CH"/>
           </a:p>
@@ -2932,7 +2936,7 @@
             <a:fld id="{4A640E62-3FA3-431E-88CE-8557D458FA1E}" type="datetimeFigureOut">
               <a:rPr lang="it-CH" smtClean="0"/>
               <a:pPr/>
-              <a:t>10.06.2010</a:t>
+              <a:t>11.06.2010</a:t>
             </a:fld>
             <a:endParaRPr lang="it-CH"/>
           </a:p>
@@ -3718,7 +3722,7 @@
             <a:fld id="{4A640E62-3FA3-431E-88CE-8557D458FA1E}" type="datetimeFigureOut">
               <a:rPr lang="it-CH" smtClean="0"/>
               <a:pPr/>
-              <a:t>10.06.2010</a:t>
+              <a:t>11.06.2010</a:t>
             </a:fld>
             <a:endParaRPr lang="it-CH"/>
           </a:p>
@@ -4497,7 +4501,7 @@
       </p:grpSpPr>
       <p:pic>
         <p:nvPicPr>
-          <p:cNvPr id="2050" name="Picture 2" descr="D:\HEIG-VD\GEN\Labo\KillerBox\Conception\Client.png"/>
+          <p:cNvPr id="1026" name="Picture 2" descr="D:\HEIG-VD\GEN\Labo\KillerBox\Conception\Client.png"/>
           <p:cNvPicPr>
             <a:picLocks noChangeAspect="1" noChangeArrowheads="1"/>
           </p:cNvPicPr>
@@ -4512,8 +4516,8 @@
         </p:blipFill>
         <p:spPr bwMode="auto">
           <a:xfrm>
-            <a:off x="1000100" y="357165"/>
-            <a:ext cx="8143900" cy="5729227"/>
+            <a:off x="1020265" y="457656"/>
+            <a:ext cx="7980891" cy="5614549"/>
           </a:xfrm>
           <a:prstGeom prst="rect">
             <a:avLst/>
@@ -4573,38 +4577,645 @@
           <a:p>
             <a:r>
               <a:rPr lang="fr-CH" dirty="0" smtClean="0"/>
-              <a:t>Jeu</a:t>
+              <a:t>Moteur du jeu</a:t>
             </a:r>
             <a:endParaRPr lang="fr-CH" dirty="0"/>
           </a:p>
         </p:txBody>
       </p:sp>
-      <p:sp>
-        <p:nvSpPr>
-          <p:cNvPr id="3" name="Espace réservé du contenu 2"/>
-          <p:cNvSpPr>
-            <a:spLocks noGrp="1"/>
-          </p:cNvSpPr>
-          <p:nvPr>
-            <p:ph idx="1"/>
-          </p:nvPr>
-        </p:nvSpPr>
-        <p:spPr/>
-        <p:txBody>
-          <a:bodyPr/>
-          <a:lstStyle/>
-          <a:p>
-            <a:r>
-              <a:rPr lang="fr-CH" dirty="0" smtClean="0"/>
-              <a:t>Carte </a:t>
-            </a:r>
-            <a:r>
-              <a:rPr lang="fr-CH" dirty="0" smtClean="0"/>
-              <a:t>unique</a:t>
-            </a:r>
-          </a:p>
-        </p:txBody>
-      </p:sp>
+      <p:grpSp>
+        <p:nvGrpSpPr>
+          <p:cNvPr id="20" name="Groupe 19"/>
+          <p:cNvGrpSpPr/>
+          <p:nvPr/>
+        </p:nvGrpSpPr>
+        <p:grpSpPr>
+          <a:xfrm>
+            <a:off x="1643042" y="1857364"/>
+            <a:ext cx="6500858" cy="3500462"/>
+            <a:chOff x="1500166" y="1928802"/>
+            <a:chExt cx="6500858" cy="3500462"/>
+          </a:xfrm>
+        </p:grpSpPr>
+        <p:sp>
+          <p:nvSpPr>
+            <p:cNvPr id="4" name="Rectangle 3"/>
+            <p:cNvSpPr/>
+            <p:nvPr/>
+          </p:nvSpPr>
+          <p:spPr>
+            <a:xfrm>
+              <a:off x="2857488" y="2143116"/>
+              <a:ext cx="1143008" cy="500066"/>
+            </a:xfrm>
+            <a:prstGeom prst="rect">
+              <a:avLst/>
+            </a:prstGeom>
+          </p:spPr>
+          <p:style>
+            <a:lnRef idx="2">
+              <a:schemeClr val="accent6"/>
+            </a:lnRef>
+            <a:fillRef idx="1">
+              <a:schemeClr val="lt1"/>
+            </a:fillRef>
+            <a:effectRef idx="0">
+              <a:schemeClr val="accent6"/>
+            </a:effectRef>
+            <a:fontRef idx="minor">
+              <a:schemeClr val="dk1"/>
+            </a:fontRef>
+          </p:style>
+          <p:txBody>
+            <a:bodyPr rtlCol="0" anchor="ctr"/>
+            <a:lstStyle/>
+            <a:p>
+              <a:pPr algn="ctr"/>
+              <a:r>
+                <a:rPr lang="fr-CH" dirty="0" smtClean="0"/>
+                <a:t>Carte</a:t>
+              </a:r>
+              <a:endParaRPr lang="fr-CH" dirty="0"/>
+            </a:p>
+          </p:txBody>
+        </p:sp>
+        <p:sp>
+          <p:nvSpPr>
+            <p:cNvPr id="5" name="Rectangle 4"/>
+            <p:cNvSpPr/>
+            <p:nvPr/>
+          </p:nvSpPr>
+          <p:spPr>
+            <a:xfrm>
+              <a:off x="1500166" y="2928934"/>
+              <a:ext cx="1143008" cy="500066"/>
+            </a:xfrm>
+            <a:prstGeom prst="rect">
+              <a:avLst/>
+            </a:prstGeom>
+          </p:spPr>
+          <p:style>
+            <a:lnRef idx="2">
+              <a:schemeClr val="accent6"/>
+            </a:lnRef>
+            <a:fillRef idx="1">
+              <a:schemeClr val="lt1"/>
+            </a:fillRef>
+            <a:effectRef idx="0">
+              <a:schemeClr val="accent6"/>
+            </a:effectRef>
+            <a:fontRef idx="minor">
+              <a:schemeClr val="dk1"/>
+            </a:fontRef>
+          </p:style>
+          <p:txBody>
+            <a:bodyPr rtlCol="0" anchor="ctr"/>
+            <a:lstStyle/>
+            <a:p>
+              <a:pPr algn="ctr"/>
+              <a:r>
+                <a:rPr lang="fr-CH" dirty="0" smtClean="0"/>
+                <a:t>Joueurs</a:t>
+              </a:r>
+              <a:endParaRPr lang="fr-CH" dirty="0"/>
+            </a:p>
+          </p:txBody>
+        </p:sp>
+        <p:sp>
+          <p:nvSpPr>
+            <p:cNvPr id="6" name="Rectangle 5"/>
+            <p:cNvSpPr/>
+            <p:nvPr/>
+          </p:nvSpPr>
+          <p:spPr>
+            <a:xfrm>
+              <a:off x="1500166" y="3857628"/>
+              <a:ext cx="1143008" cy="500066"/>
+            </a:xfrm>
+            <a:prstGeom prst="rect">
+              <a:avLst/>
+            </a:prstGeom>
+          </p:spPr>
+          <p:style>
+            <a:lnRef idx="2">
+              <a:schemeClr val="accent6"/>
+            </a:lnRef>
+            <a:fillRef idx="1">
+              <a:schemeClr val="lt1"/>
+            </a:fillRef>
+            <a:effectRef idx="0">
+              <a:schemeClr val="accent6"/>
+            </a:effectRef>
+            <a:fontRef idx="minor">
+              <a:schemeClr val="dk1"/>
+            </a:fontRef>
+          </p:style>
+          <p:txBody>
+            <a:bodyPr rtlCol="0" anchor="ctr"/>
+            <a:lstStyle/>
+            <a:p>
+              <a:pPr algn="ctr"/>
+              <a:r>
+                <a:rPr lang="fr-CH" dirty="0" smtClean="0"/>
+                <a:t>Tirs</a:t>
+              </a:r>
+              <a:endParaRPr lang="fr-CH" dirty="0"/>
+            </a:p>
+          </p:txBody>
+        </p:sp>
+        <p:sp>
+          <p:nvSpPr>
+            <p:cNvPr id="7" name="Rectangle 6"/>
+            <p:cNvSpPr/>
+            <p:nvPr/>
+          </p:nvSpPr>
+          <p:spPr>
+            <a:xfrm>
+              <a:off x="2071670" y="4929198"/>
+              <a:ext cx="1143008" cy="500066"/>
+            </a:xfrm>
+            <a:prstGeom prst="rect">
+              <a:avLst/>
+            </a:prstGeom>
+          </p:spPr>
+          <p:style>
+            <a:lnRef idx="2">
+              <a:schemeClr val="accent6"/>
+            </a:lnRef>
+            <a:fillRef idx="1">
+              <a:schemeClr val="lt1"/>
+            </a:fillRef>
+            <a:effectRef idx="0">
+              <a:schemeClr val="accent6"/>
+            </a:effectRef>
+            <a:fontRef idx="minor">
+              <a:schemeClr val="dk1"/>
+            </a:fontRef>
+          </p:style>
+          <p:txBody>
+            <a:bodyPr rtlCol="0" anchor="ctr"/>
+            <a:lstStyle/>
+            <a:p>
+              <a:pPr algn="ctr"/>
+              <a:r>
+                <a:rPr lang="fr-CH" dirty="0" smtClean="0"/>
+                <a:t>Messages</a:t>
+              </a:r>
+              <a:endParaRPr lang="fr-CH" dirty="0"/>
+            </a:p>
+          </p:txBody>
+        </p:sp>
+        <p:cxnSp>
+          <p:nvCxnSpPr>
+            <p:cNvPr id="8" name="Connecteur droit avec flèche 7"/>
+            <p:cNvCxnSpPr>
+              <a:endCxn id="4" idx="2"/>
+            </p:cNvCxnSpPr>
+            <p:nvPr/>
+          </p:nvCxnSpPr>
+          <p:spPr>
+            <a:xfrm rot="16200000" flipV="1">
+              <a:off x="3071802" y="3000372"/>
+              <a:ext cx="1143008" cy="428628"/>
+            </a:xfrm>
+            <a:prstGeom prst="straightConnector1">
+              <a:avLst/>
+            </a:prstGeom>
+            <a:ln>
+              <a:tailEnd type="arrow"/>
+            </a:ln>
+          </p:spPr>
+          <p:style>
+            <a:lnRef idx="2">
+              <a:schemeClr val="accent6"/>
+            </a:lnRef>
+            <a:fillRef idx="0">
+              <a:schemeClr val="accent6"/>
+            </a:fillRef>
+            <a:effectRef idx="1">
+              <a:schemeClr val="accent6"/>
+            </a:effectRef>
+            <a:fontRef idx="minor">
+              <a:schemeClr val="tx1"/>
+            </a:fontRef>
+          </p:style>
+        </p:cxnSp>
+        <p:cxnSp>
+          <p:nvCxnSpPr>
+            <p:cNvPr id="9" name="Connecteur droit avec flèche 8"/>
+            <p:cNvCxnSpPr>
+              <a:endCxn id="5" idx="3"/>
+            </p:cNvCxnSpPr>
+            <p:nvPr/>
+          </p:nvCxnSpPr>
+          <p:spPr>
+            <a:xfrm rot="10800000">
+              <a:off x="2643174" y="3178968"/>
+              <a:ext cx="1143008" cy="607223"/>
+            </a:xfrm>
+            <a:prstGeom prst="straightConnector1">
+              <a:avLst/>
+            </a:prstGeom>
+            <a:ln>
+              <a:tailEnd type="arrow"/>
+            </a:ln>
+          </p:spPr>
+          <p:style>
+            <a:lnRef idx="2">
+              <a:schemeClr val="accent6"/>
+            </a:lnRef>
+            <a:fillRef idx="0">
+              <a:schemeClr val="accent6"/>
+            </a:fillRef>
+            <a:effectRef idx="1">
+              <a:schemeClr val="accent6"/>
+            </a:effectRef>
+            <a:fontRef idx="minor">
+              <a:schemeClr val="tx1"/>
+            </a:fontRef>
+          </p:style>
+        </p:cxnSp>
+        <p:cxnSp>
+          <p:nvCxnSpPr>
+            <p:cNvPr id="10" name="Connecteur droit avec flèche 9"/>
+            <p:cNvCxnSpPr>
+              <a:endCxn id="6" idx="3"/>
+            </p:cNvCxnSpPr>
+            <p:nvPr/>
+          </p:nvCxnSpPr>
+          <p:spPr>
+            <a:xfrm rot="10800000" flipV="1">
+              <a:off x="2643174" y="3857627"/>
+              <a:ext cx="1214446" cy="250033"/>
+            </a:xfrm>
+            <a:prstGeom prst="straightConnector1">
+              <a:avLst/>
+            </a:prstGeom>
+            <a:ln>
+              <a:tailEnd type="arrow"/>
+            </a:ln>
+          </p:spPr>
+          <p:style>
+            <a:lnRef idx="2">
+              <a:schemeClr val="accent6"/>
+            </a:lnRef>
+            <a:fillRef idx="0">
+              <a:schemeClr val="accent6"/>
+            </a:fillRef>
+            <a:effectRef idx="1">
+              <a:schemeClr val="accent6"/>
+            </a:effectRef>
+            <a:fontRef idx="minor">
+              <a:schemeClr val="tx1"/>
+            </a:fontRef>
+          </p:style>
+        </p:cxnSp>
+        <p:cxnSp>
+          <p:nvCxnSpPr>
+            <p:cNvPr id="11" name="Connecteur droit avec flèche 10"/>
+            <p:cNvCxnSpPr>
+              <a:endCxn id="7" idx="0"/>
+            </p:cNvCxnSpPr>
+            <p:nvPr/>
+          </p:nvCxnSpPr>
+          <p:spPr>
+            <a:xfrm rot="5400000">
+              <a:off x="2571736" y="4000504"/>
+              <a:ext cx="1000132" cy="857256"/>
+            </a:xfrm>
+            <a:prstGeom prst="straightConnector1">
+              <a:avLst/>
+            </a:prstGeom>
+            <a:ln>
+              <a:tailEnd type="arrow"/>
+            </a:ln>
+          </p:spPr>
+          <p:style>
+            <a:lnRef idx="2">
+              <a:schemeClr val="accent6"/>
+            </a:lnRef>
+            <a:fillRef idx="0">
+              <a:schemeClr val="accent6"/>
+            </a:fillRef>
+            <a:effectRef idx="1">
+              <a:schemeClr val="accent6"/>
+            </a:effectRef>
+            <a:fontRef idx="minor">
+              <a:schemeClr val="tx1"/>
+            </a:fontRef>
+          </p:style>
+        </p:cxnSp>
+        <p:cxnSp>
+          <p:nvCxnSpPr>
+            <p:cNvPr id="12" name="Connecteur droit avec flèche 11"/>
+            <p:cNvCxnSpPr/>
+            <p:nvPr/>
+          </p:nvCxnSpPr>
+          <p:spPr>
+            <a:xfrm rot="10800000" flipV="1">
+              <a:off x="4429125" y="2428866"/>
+              <a:ext cx="1000133" cy="928697"/>
+            </a:xfrm>
+            <a:prstGeom prst="straightConnector1">
+              <a:avLst/>
+            </a:prstGeom>
+            <a:ln>
+              <a:tailEnd type="arrow"/>
+            </a:ln>
+          </p:spPr>
+          <p:style>
+            <a:lnRef idx="2">
+              <a:schemeClr val="accent6"/>
+            </a:lnRef>
+            <a:fillRef idx="0">
+              <a:schemeClr val="accent6"/>
+            </a:fillRef>
+            <a:effectRef idx="1">
+              <a:schemeClr val="accent6"/>
+            </a:effectRef>
+            <a:fontRef idx="minor">
+              <a:schemeClr val="tx1"/>
+            </a:fontRef>
+          </p:style>
+        </p:cxnSp>
+        <p:cxnSp>
+          <p:nvCxnSpPr>
+            <p:cNvPr id="13" name="Connecteur droit avec flèche 12"/>
+            <p:cNvCxnSpPr/>
+            <p:nvPr/>
+          </p:nvCxnSpPr>
+          <p:spPr>
+            <a:xfrm>
+              <a:off x="5429256" y="2500305"/>
+              <a:ext cx="1214446" cy="857257"/>
+            </a:xfrm>
+            <a:prstGeom prst="straightConnector1">
+              <a:avLst/>
+            </a:prstGeom>
+            <a:ln>
+              <a:tailEnd type="arrow"/>
+            </a:ln>
+          </p:spPr>
+          <p:style>
+            <a:lnRef idx="2">
+              <a:schemeClr val="accent6"/>
+            </a:lnRef>
+            <a:fillRef idx="0">
+              <a:schemeClr val="accent6"/>
+            </a:fillRef>
+            <a:effectRef idx="1">
+              <a:schemeClr val="accent6"/>
+            </a:effectRef>
+            <a:fontRef idx="minor">
+              <a:schemeClr val="tx1"/>
+            </a:fontRef>
+          </p:style>
+        </p:cxnSp>
+        <p:sp>
+          <p:nvSpPr>
+            <p:cNvPr id="14" name="Rectangle 13"/>
+            <p:cNvSpPr/>
+            <p:nvPr/>
+          </p:nvSpPr>
+          <p:spPr>
+            <a:xfrm>
+              <a:off x="4929190" y="1928802"/>
+              <a:ext cx="1143008" cy="928694"/>
+            </a:xfrm>
+            <a:prstGeom prst="rect">
+              <a:avLst/>
+            </a:prstGeom>
+          </p:spPr>
+          <p:style>
+            <a:lnRef idx="2">
+              <a:schemeClr val="accent6">
+                <a:shade val="50000"/>
+              </a:schemeClr>
+            </a:lnRef>
+            <a:fillRef idx="1">
+              <a:schemeClr val="accent6"/>
+            </a:fillRef>
+            <a:effectRef idx="0">
+              <a:schemeClr val="accent6"/>
+            </a:effectRef>
+            <a:fontRef idx="minor">
+              <a:schemeClr val="lt1"/>
+            </a:fontRef>
+          </p:style>
+          <p:txBody>
+            <a:bodyPr rtlCol="0" anchor="ctr"/>
+            <a:lstStyle/>
+            <a:p>
+              <a:pPr algn="ctr"/>
+              <a:r>
+                <a:rPr lang="fr-CH" dirty="0" smtClean="0"/>
+                <a:t>Panel</a:t>
+              </a:r>
+              <a:endParaRPr lang="fr-CH" dirty="0"/>
+            </a:p>
+          </p:txBody>
+        </p:sp>
+        <p:cxnSp>
+          <p:nvCxnSpPr>
+            <p:cNvPr id="15" name="Connecteur droit avec flèche 14"/>
+            <p:cNvCxnSpPr>
+              <a:endCxn id="19" idx="3"/>
+            </p:cNvCxnSpPr>
+            <p:nvPr/>
+          </p:nvCxnSpPr>
+          <p:spPr>
+            <a:xfrm rot="10800000">
+              <a:off x="4429124" y="3821910"/>
+              <a:ext cx="2928958" cy="35719"/>
+            </a:xfrm>
+            <a:prstGeom prst="straightConnector1">
+              <a:avLst/>
+            </a:prstGeom>
+            <a:ln>
+              <a:tailEnd type="arrow"/>
+            </a:ln>
+          </p:spPr>
+          <p:style>
+            <a:lnRef idx="2">
+              <a:schemeClr val="accent6"/>
+            </a:lnRef>
+            <a:fillRef idx="0">
+              <a:schemeClr val="accent6"/>
+            </a:fillRef>
+            <a:effectRef idx="1">
+              <a:schemeClr val="accent6"/>
+            </a:effectRef>
+            <a:fontRef idx="minor">
+              <a:schemeClr val="tx1"/>
+            </a:fontRef>
+          </p:style>
+        </p:cxnSp>
+        <p:sp>
+          <p:nvSpPr>
+            <p:cNvPr id="16" name="Rectangle 15"/>
+            <p:cNvSpPr/>
+            <p:nvPr/>
+          </p:nvSpPr>
+          <p:spPr>
+            <a:xfrm>
+              <a:off x="6643702" y="3357562"/>
+              <a:ext cx="1357322" cy="928694"/>
+            </a:xfrm>
+            <a:prstGeom prst="rect">
+              <a:avLst/>
+            </a:prstGeom>
+          </p:spPr>
+          <p:style>
+            <a:lnRef idx="2">
+              <a:schemeClr val="accent6">
+                <a:shade val="50000"/>
+              </a:schemeClr>
+            </a:lnRef>
+            <a:fillRef idx="1">
+              <a:schemeClr val="accent6"/>
+            </a:fillRef>
+            <a:effectRef idx="0">
+              <a:schemeClr val="accent6"/>
+            </a:effectRef>
+            <a:fontRef idx="minor">
+              <a:schemeClr val="lt1"/>
+            </a:fontRef>
+          </p:style>
+          <p:txBody>
+            <a:bodyPr rtlCol="0" anchor="ctr"/>
+            <a:lstStyle/>
+            <a:p>
+              <a:pPr algn="ctr"/>
+              <a:r>
+                <a:rPr lang="fr-CH" dirty="0" smtClean="0"/>
+                <a:t>Contrôleur</a:t>
+              </a:r>
+              <a:endParaRPr lang="fr-CH" dirty="0"/>
+            </a:p>
+          </p:txBody>
+        </p:sp>
+        <p:sp>
+          <p:nvSpPr>
+            <p:cNvPr id="17" name="Rectangle 16"/>
+            <p:cNvSpPr/>
+            <p:nvPr/>
+          </p:nvSpPr>
+          <p:spPr>
+            <a:xfrm>
+              <a:off x="3786182" y="4929198"/>
+              <a:ext cx="1143008" cy="500066"/>
+            </a:xfrm>
+            <a:prstGeom prst="rect">
+              <a:avLst/>
+            </a:prstGeom>
+          </p:spPr>
+          <p:style>
+            <a:lnRef idx="2">
+              <a:schemeClr val="accent6"/>
+            </a:lnRef>
+            <a:fillRef idx="1">
+              <a:schemeClr val="lt1"/>
+            </a:fillRef>
+            <a:effectRef idx="0">
+              <a:schemeClr val="accent6"/>
+            </a:effectRef>
+            <a:fontRef idx="minor">
+              <a:schemeClr val="dk1"/>
+            </a:fontRef>
+          </p:style>
+          <p:txBody>
+            <a:bodyPr rtlCol="0" anchor="ctr"/>
+            <a:lstStyle/>
+            <a:p>
+              <a:pPr algn="ctr"/>
+              <a:r>
+                <a:rPr lang="fr-CH" dirty="0" smtClean="0"/>
+                <a:t>Scores</a:t>
+              </a:r>
+              <a:endParaRPr lang="fr-CH" dirty="0"/>
+            </a:p>
+          </p:txBody>
+        </p:sp>
+        <p:cxnSp>
+          <p:nvCxnSpPr>
+            <p:cNvPr id="18" name="Connecteur droit avec flèche 17"/>
+            <p:cNvCxnSpPr>
+              <a:endCxn id="17" idx="0"/>
+            </p:cNvCxnSpPr>
+            <p:nvPr/>
+          </p:nvCxnSpPr>
+          <p:spPr>
+            <a:xfrm rot="16200000" flipH="1">
+              <a:off x="3571868" y="4143380"/>
+              <a:ext cx="1071570" cy="500066"/>
+            </a:xfrm>
+            <a:prstGeom prst="straightConnector1">
+              <a:avLst/>
+            </a:prstGeom>
+            <a:ln>
+              <a:tailEnd type="arrow"/>
+            </a:ln>
+          </p:spPr>
+          <p:style>
+            <a:lnRef idx="2">
+              <a:schemeClr val="accent6"/>
+            </a:lnRef>
+            <a:fillRef idx="0">
+              <a:schemeClr val="accent6"/>
+            </a:fillRef>
+            <a:effectRef idx="1">
+              <a:schemeClr val="accent6"/>
+            </a:effectRef>
+            <a:fontRef idx="minor">
+              <a:schemeClr val="tx1"/>
+            </a:fontRef>
+          </p:style>
+        </p:cxnSp>
+        <p:sp>
+          <p:nvSpPr>
+            <p:cNvPr id="19" name="Rectangle 18"/>
+            <p:cNvSpPr/>
+            <p:nvPr/>
+          </p:nvSpPr>
+          <p:spPr>
+            <a:xfrm>
+              <a:off x="3286116" y="3357562"/>
+              <a:ext cx="1143008" cy="928694"/>
+            </a:xfrm>
+            <a:prstGeom prst="rect">
+              <a:avLst/>
+            </a:prstGeom>
+          </p:spPr>
+          <p:style>
+            <a:lnRef idx="2">
+              <a:schemeClr val="accent6">
+                <a:shade val="50000"/>
+              </a:schemeClr>
+            </a:lnRef>
+            <a:fillRef idx="1">
+              <a:schemeClr val="accent6"/>
+            </a:fillRef>
+            <a:effectRef idx="0">
+              <a:schemeClr val="accent6"/>
+            </a:effectRef>
+            <a:fontRef idx="minor">
+              <a:schemeClr val="lt1"/>
+            </a:fontRef>
+          </p:style>
+          <p:txBody>
+            <a:bodyPr rtlCol="0" anchor="ctr"/>
+            <a:lstStyle/>
+            <a:p>
+              <a:pPr algn="ctr"/>
+              <a:r>
+                <a:rPr lang="fr-CH" dirty="0" smtClean="0"/>
+                <a:t>Modèle</a:t>
+              </a:r>
+              <a:endParaRPr lang="fr-CH" dirty="0"/>
+            </a:p>
+          </p:txBody>
+        </p:sp>
+      </p:grpSp>
     </p:spTree>
   </p:cSld>
   <p:clrMapOvr>
@@ -4613,13 +5224,6 @@
   <p:transition>
     <p:fade/>
   </p:transition>
-  <p:timing>
-    <p:tnLst>
-      <p:par>
-        <p:cTn id="1" dur="indefinite" restart="never" nodeType="tmRoot"/>
-      </p:par>
-    </p:tnLst>
-  </p:timing>
 </p:sld>
 </file>
 
@@ -4657,7 +5261,7 @@
           <a:p>
             <a:r>
               <a:rPr lang="fr-CH" dirty="0" smtClean="0"/>
-              <a:t>Jeu</a:t>
+              <a:t>Moteur du jeu</a:t>
             </a:r>
             <a:endParaRPr lang="fr-CH" dirty="0"/>
           </a:p>
@@ -4678,13 +5282,42 @@
           <a:bodyPr/>
           <a:lstStyle/>
           <a:p>
+            <a:r>
+              <a:rPr lang="fr-CH" dirty="0" smtClean="0"/>
+              <a:t>Répartition de la charge de calcul</a:t>
+            </a:r>
+          </a:p>
+          <a:p>
+            <a:r>
+              <a:rPr lang="fr-CH" dirty="0" smtClean="0"/>
+              <a:t>Tout est calculé et </a:t>
+            </a:r>
+            <a:r>
+              <a:rPr lang="fr-CH" dirty="0" smtClean="0"/>
+              <a:t>contrôlé </a:t>
+            </a:r>
+            <a:r>
+              <a:rPr lang="fr-CH" dirty="0" smtClean="0"/>
+              <a:t>sur le client</a:t>
+            </a:r>
+          </a:p>
+          <a:p>
+            <a:r>
+              <a:rPr lang="fr-CH" dirty="0" smtClean="0"/>
+              <a:t>Serveur broadcast les paquets aux clients d’une même partie</a:t>
+            </a:r>
+          </a:p>
+          <a:p>
+            <a:pPr>
+              <a:buNone/>
+            </a:pPr>
             <a:endParaRPr lang="fr-CH" dirty="0"/>
           </a:p>
         </p:txBody>
       </p:sp>
       <p:pic>
         <p:nvPicPr>
-          <p:cNvPr id="4" name="Picture 2" descr="D:\HEIG-VD\GEN\Labo\KillerBox\Documentation\jeu1.png"/>
+          <p:cNvPr id="4" name="Picture 2" descr="http://www.tulanelink.com/legal/balance2.gif"/>
           <p:cNvPicPr>
             <a:picLocks noChangeAspect="1" noChangeArrowheads="1"/>
           </p:cNvPicPr>
@@ -4699,8 +5332,8 @@
         </p:blipFill>
         <p:spPr bwMode="auto">
           <a:xfrm>
-            <a:off x="1428728" y="1428736"/>
-            <a:ext cx="7429552" cy="4831776"/>
+            <a:off x="3714744" y="4071942"/>
+            <a:ext cx="2381224" cy="1741270"/>
           </a:xfrm>
           <a:prstGeom prst="rect">
             <a:avLst/>
@@ -4708,6 +5341,66 @@
           <a:noFill/>
         </p:spPr>
       </p:pic>
+      <p:sp>
+        <p:nvSpPr>
+          <p:cNvPr id="5" name="ZoneTexte 4"/>
+          <p:cNvSpPr txBox="1"/>
+          <p:nvPr/>
+        </p:nvSpPr>
+        <p:spPr>
+          <a:xfrm>
+            <a:off x="5643570" y="5643578"/>
+            <a:ext cx="744114" cy="369332"/>
+          </a:xfrm>
+          <a:prstGeom prst="rect">
+            <a:avLst/>
+          </a:prstGeom>
+          <a:noFill/>
+        </p:spPr>
+        <p:txBody>
+          <a:bodyPr wrap="none" rtlCol="0">
+            <a:spAutoFit/>
+          </a:bodyPr>
+          <a:lstStyle/>
+          <a:p>
+            <a:r>
+              <a:rPr lang="fr-CH" dirty="0" smtClean="0"/>
+              <a:t>Client</a:t>
+            </a:r>
+            <a:endParaRPr lang="fr-CH" dirty="0"/>
+          </a:p>
+        </p:txBody>
+      </p:sp>
+      <p:sp>
+        <p:nvSpPr>
+          <p:cNvPr id="6" name="ZoneTexte 5"/>
+          <p:cNvSpPr txBox="1"/>
+          <p:nvPr/>
+        </p:nvSpPr>
+        <p:spPr>
+          <a:xfrm>
+            <a:off x="3643306" y="5286388"/>
+            <a:ext cx="923651" cy="369332"/>
+          </a:xfrm>
+          <a:prstGeom prst="rect">
+            <a:avLst/>
+          </a:prstGeom>
+          <a:noFill/>
+        </p:spPr>
+        <p:txBody>
+          <a:bodyPr wrap="none" rtlCol="0">
+            <a:spAutoFit/>
+          </a:bodyPr>
+          <a:lstStyle/>
+          <a:p>
+            <a:r>
+              <a:rPr lang="fr-CH" dirty="0" smtClean="0"/>
+              <a:t>Serveur</a:t>
+            </a:r>
+            <a:endParaRPr lang="fr-CH" dirty="0"/>
+          </a:p>
+        </p:txBody>
+      </p:sp>
     </p:spTree>
   </p:cSld>
   <p:clrMapOvr>
@@ -4716,13 +5409,6 @@
   <p:transition>
     <p:fade/>
   </p:transition>
-  <p:timing>
-    <p:tnLst>
-      <p:par>
-        <p:cTn id="1" dur="indefinite" restart="never" nodeType="tmRoot"/>
-      </p:par>
-    </p:tnLst>
-  </p:timing>
 </p:sld>
 </file>
 
@@ -4760,7 +5446,7 @@
           <a:p>
             <a:r>
               <a:rPr lang="fr-CH" dirty="0" smtClean="0"/>
-              <a:t>Démonstration</a:t>
+              <a:t>Coté créateur</a:t>
             </a:r>
             <a:endParaRPr lang="fr-CH" dirty="0"/>
           </a:p>
@@ -4781,13 +5467,104 @@
           <a:bodyPr/>
           <a:lstStyle/>
           <a:p>
-            <a:pPr>
-              <a:buNone/>
+            <a:pPr marL="633222" indent="-514350">
+              <a:buFont typeface="+mj-lt"/>
+              <a:buAutoNum type="arabicPeriod"/>
             </a:pPr>
-            <a:endParaRPr lang="fr-CH" dirty="0"/>
-          </a:p>
-        </p:txBody>
-      </p:sp>
+            <a:r>
+              <a:rPr lang="fr-CH" dirty="0" smtClean="0"/>
+              <a:t>Création du modèle et contrôleur</a:t>
+            </a:r>
+          </a:p>
+          <a:p>
+            <a:pPr marL="633222" indent="-514350">
+              <a:buFont typeface="+mj-lt"/>
+              <a:buAutoNum type="arabicPeriod"/>
+            </a:pPr>
+            <a:r>
+              <a:rPr lang="fr-CH" dirty="0" smtClean="0"/>
+              <a:t>Choix de la carte de jeu (Background)</a:t>
+            </a:r>
+          </a:p>
+          <a:p>
+            <a:pPr marL="633222" indent="-514350">
+              <a:buFont typeface="+mj-lt"/>
+              <a:buAutoNum type="arabicPeriod"/>
+            </a:pPr>
+            <a:r>
+              <a:rPr lang="fr-CH" dirty="0" smtClean="0"/>
+              <a:t>Génère une position aléatoire des joueurs</a:t>
+            </a:r>
+          </a:p>
+          <a:p>
+            <a:pPr marL="633222" indent="-514350">
+              <a:buFont typeface="+mj-lt"/>
+              <a:buAutoNum type="arabicPeriod"/>
+            </a:pPr>
+            <a:r>
+              <a:rPr lang="fr-CH" dirty="0" smtClean="0"/>
+              <a:t>Ordonne aux autres clients de changer de panel</a:t>
+            </a:r>
+          </a:p>
+          <a:p>
+            <a:pPr marL="633222" indent="-514350">
+              <a:buFont typeface="+mj-lt"/>
+              <a:buAutoNum type="arabicPeriod"/>
+            </a:pPr>
+            <a:r>
+              <a:rPr lang="fr-CH" dirty="0" smtClean="0"/>
+              <a:t>Envoi les données du modèle aux clients</a:t>
+            </a:r>
+          </a:p>
+          <a:p>
+            <a:pPr marL="633222" indent="-514350">
+              <a:buFont typeface="+mj-lt"/>
+              <a:buAutoNum type="arabicPeriod"/>
+            </a:pPr>
+            <a:r>
+              <a:rPr lang="fr-CH" dirty="0" smtClean="0"/>
+              <a:t>Indique que la partie </a:t>
+            </a:r>
+            <a:r>
+              <a:rPr lang="fr-CH" dirty="0" smtClean="0"/>
+              <a:t>commence !</a:t>
+            </a:r>
+            <a:endParaRPr lang="fr-CH" dirty="0" smtClean="0"/>
+          </a:p>
+        </p:txBody>
+      </p:sp>
+      <p:pic>
+        <p:nvPicPr>
+          <p:cNvPr id="4" name="Picture 2"/>
+          <p:cNvPicPr>
+            <a:picLocks noChangeAspect="1" noChangeArrowheads="1"/>
+          </p:cNvPicPr>
+          <p:nvPr/>
+        </p:nvPicPr>
+        <p:blipFill>
+          <a:blip r:embed="rId2" cstate="print"/>
+          <a:srcRect/>
+          <a:stretch>
+            <a:fillRect/>
+          </a:stretch>
+        </p:blipFill>
+        <p:spPr bwMode="auto">
+          <a:xfrm>
+            <a:off x="5786446" y="642918"/>
+            <a:ext cx="2415065" cy="571504"/>
+          </a:xfrm>
+          <a:prstGeom prst="rect">
+            <a:avLst/>
+          </a:prstGeom>
+          <a:noFill/>
+          <a:ln w="9525">
+            <a:noFill/>
+            <a:miter lim="800000"/>
+            <a:headEnd/>
+            <a:tailEnd/>
+          </a:ln>
+        </p:spPr>
+      </p:pic>
     </p:spTree>
   </p:cSld>
   <p:clrMapOvr>
@@ -4796,13 +5573,6 @@
   <p:transition>
     <p:fade/>
   </p:transition>
-  <p:timing>
-    <p:tnLst>
-      <p:par>
-        <p:cTn id="1" dur="indefinite" restart="never" nodeType="tmRoot"/>
-      </p:par>
-    </p:tnLst>
-  </p:timing>
 </p:sld>
 </file>
 
@@ -4840,7 +5610,7 @@
           <a:p>
             <a:r>
               <a:rPr lang="fr-CH" dirty="0" smtClean="0"/>
-              <a:t>Améliorations</a:t>
+              <a:t>Affichage et actions</a:t>
             </a:r>
             <a:endParaRPr lang="fr-CH" dirty="0"/>
           </a:p>
@@ -4856,18 +5626,145 @@
             <p:ph idx="1"/>
           </p:nvPr>
         </p:nvSpPr>
-        <p:spPr/>
-        <p:txBody>
-          <a:bodyPr/>
+        <p:spPr>
+          <a:xfrm>
+            <a:off x="1435608" y="1447800"/>
+            <a:ext cx="4065086" cy="4800600"/>
+          </a:xfrm>
+        </p:spPr>
+        <p:txBody>
+          <a:bodyPr>
+            <a:normAutofit fontScale="92500" lnSpcReduction="10000"/>
+          </a:bodyPr>
           <a:lstStyle/>
           <a:p>
-            <a:pPr>
-              <a:buNone/>
-            </a:pPr>
-            <a:endParaRPr lang="fr-CH" dirty="0" smtClean="0"/>
-          </a:p>
-        </p:txBody>
-      </p:sp>
+            <a:r>
+              <a:rPr lang="it-CH" dirty="0" smtClean="0"/>
+              <a:t>2 threads principales</a:t>
+            </a:r>
+          </a:p>
+          <a:p>
+            <a:pPr lvl="1"/>
+            <a:r>
+              <a:rPr lang="it-CH" dirty="0" smtClean="0"/>
+              <a:t>Affichage</a:t>
+            </a:r>
+          </a:p>
+          <a:p>
+            <a:pPr lvl="2"/>
+            <a:r>
+              <a:rPr lang="it-CH" dirty="0" smtClean="0"/>
+              <a:t>Dessine la zone de </a:t>
+            </a:r>
+            <a:r>
+              <a:rPr lang="it-CH" dirty="0" smtClean="0"/>
+              <a:t>jeu</a:t>
+            </a:r>
+            <a:br>
+              <a:rPr lang="it-CH" dirty="0" smtClean="0"/>
+            </a:br>
+            <a:r>
+              <a:rPr lang="it-CH" dirty="0" smtClean="0"/>
+              <a:t>(modèle</a:t>
+            </a:r>
+            <a:r>
+              <a:rPr lang="it-CH" dirty="0" smtClean="0"/>
+              <a:t>)</a:t>
+            </a:r>
+          </a:p>
+          <a:p>
+            <a:pPr lvl="2"/>
+            <a:r>
+              <a:rPr lang="it-CH" dirty="0" smtClean="0"/>
+              <a:t>Carte</a:t>
+            </a:r>
+          </a:p>
+          <a:p>
+            <a:pPr lvl="2"/>
+            <a:r>
+              <a:rPr lang="it-CH" dirty="0" smtClean="0"/>
+              <a:t>Tirs</a:t>
+            </a:r>
+          </a:p>
+          <a:p>
+            <a:pPr lvl="2"/>
+            <a:r>
+              <a:rPr lang="it-CH" dirty="0" smtClean="0"/>
+              <a:t>Joueurs</a:t>
+            </a:r>
+          </a:p>
+          <a:p>
+            <a:pPr lvl="2"/>
+            <a:r>
+              <a:rPr lang="it-CH" dirty="0" smtClean="0"/>
+              <a:t>Messages</a:t>
+            </a:r>
+          </a:p>
+          <a:p>
+            <a:pPr lvl="1"/>
+            <a:r>
+              <a:rPr lang="it-CH" dirty="0" smtClean="0"/>
+              <a:t>Action</a:t>
+            </a:r>
+          </a:p>
+          <a:p>
+            <a:pPr lvl="2"/>
+            <a:r>
+              <a:rPr lang="it-CH" dirty="0" smtClean="0"/>
+              <a:t>Gestion des déplacements</a:t>
+            </a:r>
+          </a:p>
+          <a:p>
+            <a:pPr lvl="2"/>
+            <a:r>
+              <a:rPr lang="it-CH" dirty="0" smtClean="0"/>
+              <a:t>Rotation</a:t>
+            </a:r>
+          </a:p>
+          <a:p>
+            <a:pPr lvl="2"/>
+            <a:r>
+              <a:rPr lang="it-CH" dirty="0" smtClean="0"/>
+              <a:t>Tirs</a:t>
+            </a:r>
+          </a:p>
+          <a:p>
+            <a:endParaRPr lang="fr-CH" dirty="0"/>
+          </a:p>
+        </p:txBody>
+      </p:sp>
+      <p:pic>
+        <p:nvPicPr>
+          <p:cNvPr id="4" name="Picture 2"/>
+          <p:cNvPicPr>
+            <a:picLocks noChangeAspect="1" noChangeArrowheads="1"/>
+          </p:cNvPicPr>
+          <p:nvPr/>
+        </p:nvPicPr>
+        <p:blipFill>
+          <a:blip r:embed="rId2" cstate="print"/>
+          <a:srcRect/>
+          <a:stretch>
+            <a:fillRect/>
+          </a:stretch>
+        </p:blipFill>
+        <p:spPr bwMode="auto">
+          <a:xfrm>
+            <a:off x="5643570" y="1571612"/>
+            <a:ext cx="3299425" cy="3990971"/>
+          </a:xfrm>
+          <a:prstGeom prst="rect">
+            <a:avLst/>
+          </a:prstGeom>
+          <a:noFill/>
+          <a:ln w="9525">
+            <a:noFill/>
+            <a:miter lim="800000"/>
+            <a:headEnd/>
+            <a:tailEnd/>
+          </a:ln>
+        </p:spPr>
+      </p:pic>
     </p:spTree>
   </p:cSld>
   <p:clrMapOvr>
@@ -4912,10 +5809,10 @@
           <a:lstStyle/>
           <a:p>
             <a:r>
-              <a:rPr lang="it-CH" dirty="0" smtClean="0"/>
-              <a:t>Conclusion</a:t>
-            </a:r>
-            <a:endParaRPr lang="it-CH" dirty="0"/>
+              <a:rPr lang="fr-CH" dirty="0" smtClean="0"/>
+              <a:t>Rafraichissement </a:t>
+            </a:r>
+            <a:endParaRPr lang="fr-CH" dirty="0"/>
           </a:p>
         </p:txBody>
       </p:sp>
@@ -4935,12 +5832,50 @@
           <a:lstStyle/>
           <a:p>
             <a:r>
-              <a:rPr lang="it-CH" dirty="0" smtClean="0"/>
-              <a:t>Pas de mode par équipe</a:t>
-            </a:r>
-          </a:p>
-        </p:txBody>
-      </p:sp>
+              <a:rPr lang="fr-CH" dirty="0" smtClean="0"/>
+              <a:t>25 FPS (Image par seconde)</a:t>
+            </a:r>
+          </a:p>
+          <a:p>
+            <a:pPr lvl="1"/>
+            <a:r>
+              <a:rPr lang="fr-CH" dirty="0" smtClean="0"/>
+              <a:t>Télévision (PAL</a:t>
+            </a:r>
+            <a:r>
+              <a:rPr lang="fr-CH" dirty="0" smtClean="0"/>
+              <a:t>)</a:t>
+            </a:r>
+            <a:endParaRPr lang="fr-CH" dirty="0" smtClean="0"/>
+          </a:p>
+        </p:txBody>
+      </p:sp>
+      <p:pic>
+        <p:nvPicPr>
+          <p:cNvPr id="4" name="Picture 4" descr="http://www.wildwestweb.net/flicks/carriage.jpg"/>
+          <p:cNvPicPr>
+            <a:picLocks noChangeAspect="1" noChangeArrowheads="1"/>
+          </p:cNvPicPr>
+          <p:nvPr/>
+        </p:nvPicPr>
+        <p:blipFill>
+          <a:blip r:embed="rId2" cstate="print"/>
+          <a:srcRect/>
+          <a:stretch>
+            <a:fillRect/>
+          </a:stretch>
+        </p:blipFill>
+        <p:spPr bwMode="auto">
+          <a:xfrm>
+            <a:off x="2928926" y="3214686"/>
+            <a:ext cx="3460616" cy="2295519"/>
+          </a:xfrm>
+          <a:prstGeom prst="rect">
+            <a:avLst/>
+          </a:prstGeom>
+          <a:noFill/>
+        </p:spPr>
+      </p:pic>
     </p:spTree>
   </p:cSld>
   <p:clrMapOvr>
@@ -4949,13 +5884,6 @@
   <p:transition>
     <p:fade/>
   </p:transition>
-  <p:timing>
-    <p:tnLst>
-      <p:par>
-        <p:cTn id="1" dur="indefinite" restart="never" nodeType="tmRoot"/>
-      </p:par>
-    </p:tnLst>
-  </p:timing>
 </p:sld>
 </file>
 
@@ -4992,36 +5920,215 @@
           <a:lstStyle/>
           <a:p>
             <a:r>
-              <a:rPr lang="it-CH" dirty="0" smtClean="0"/>
-              <a:t>Questions ?</a:t>
-            </a:r>
-            <a:endParaRPr lang="it-CH" dirty="0"/>
-          </a:p>
-        </p:txBody>
-      </p:sp>
-      <p:pic>
-        <p:nvPicPr>
-          <p:cNvPr id="4" name="Espace réservé du contenu 3" descr="domande-risposte.jpg"/>
-          <p:cNvPicPr>
-            <a:picLocks noGrp="1" noChangeAspect="1"/>
-          </p:cNvPicPr>
+              <a:rPr lang="fr-CH" dirty="0" smtClean="0"/>
+              <a:t>Paquets</a:t>
+            </a:r>
+            <a:endParaRPr lang="fr-CH" dirty="0"/>
+          </a:p>
+        </p:txBody>
+      </p:sp>
+      <p:sp>
+        <p:nvSpPr>
+          <p:cNvPr id="3" name="Espace réservé du contenu 2"/>
+          <p:cNvSpPr>
+            <a:spLocks noGrp="1"/>
+          </p:cNvSpPr>
           <p:nvPr>
             <p:ph idx="1"/>
           </p:nvPr>
-        </p:nvPicPr>
-        <p:blipFill>
-          <a:blip r:embed="rId2" cstate="print"/>
-          <a:stretch>
-            <a:fillRect/>
-          </a:stretch>
-        </p:blipFill>
-        <p:spPr>
-          <a:xfrm>
-            <a:off x="3279775" y="1987550"/>
-            <a:ext cx="3810000" cy="3721100"/>
-          </a:xfrm>
-        </p:spPr>
-      </p:pic>
+        </p:nvSpPr>
+        <p:spPr/>
+        <p:txBody>
+          <a:bodyPr/>
+          <a:lstStyle/>
+          <a:p>
+            <a:r>
+              <a:rPr lang="fr-CH" dirty="0" smtClean="0"/>
+              <a:t>Type : chaine de caractères</a:t>
+            </a:r>
+          </a:p>
+          <a:p>
+            <a:r>
+              <a:rPr lang="fr-CH" dirty="0" smtClean="0"/>
+              <a:t>Exemple :</a:t>
+            </a:r>
+          </a:p>
+          <a:p>
+            <a:pPr lvl="1"/>
+            <a:r>
+              <a:rPr lang="fr-CH" dirty="0" smtClean="0"/>
+              <a:t>Déplacement</a:t>
+            </a:r>
+          </a:p>
+          <a:p>
+            <a:pPr lvl="2"/>
+            <a:r>
+              <a:rPr lang="fr-CH" dirty="0" smtClean="0"/>
+              <a:t>#</a:t>
+            </a:r>
+            <a:r>
+              <a:rPr lang="fr-CH" dirty="0" err="1" smtClean="0"/>
+              <a:t>game</a:t>
+            </a:r>
+            <a:r>
+              <a:rPr lang="fr-CH" dirty="0" smtClean="0"/>
+              <a:t>#infos#</a:t>
+            </a:r>
+            <a:r>
+              <a:rPr lang="fr-CH" dirty="0" err="1" smtClean="0"/>
+              <a:t>others</a:t>
+            </a:r>
+            <a:r>
+              <a:rPr lang="fr-CH" dirty="0" smtClean="0"/>
+              <a:t>#</a:t>
+            </a:r>
+            <a:r>
+              <a:rPr lang="fr-CH" dirty="0" err="1" smtClean="0"/>
+              <a:t>positionJoueur</a:t>
+            </a:r>
+            <a:r>
+              <a:rPr lang="fr-CH" dirty="0" smtClean="0"/>
+              <a:t>#a#244#89#49#2.4172296967820337#</a:t>
+            </a:r>
+          </a:p>
+          <a:p>
+            <a:pPr lvl="1"/>
+            <a:r>
+              <a:rPr lang="fr-CH" dirty="0" smtClean="0"/>
+              <a:t>Tir</a:t>
+            </a:r>
+          </a:p>
+          <a:p>
+            <a:pPr lvl="2"/>
+            <a:r>
+              <a:rPr lang="fr-CH" dirty="0" smtClean="0"/>
+              <a:t>#</a:t>
+            </a:r>
+            <a:r>
+              <a:rPr lang="fr-CH" dirty="0" err="1" smtClean="0"/>
+              <a:t>game</a:t>
+            </a:r>
+            <a:r>
+              <a:rPr lang="fr-CH" dirty="0" smtClean="0"/>
+              <a:t>#infos#</a:t>
+            </a:r>
+            <a:r>
+              <a:rPr lang="fr-CH" dirty="0" err="1" smtClean="0"/>
+              <a:t>others</a:t>
+            </a:r>
+            <a:r>
+              <a:rPr lang="fr-CH" dirty="0" smtClean="0"/>
+              <a:t>#tir#b#2.6158946265454195#10#</a:t>
+            </a:r>
+          </a:p>
+          <a:p>
+            <a:pPr lvl="1"/>
+            <a:r>
+              <a:rPr lang="fr-CH" dirty="0" smtClean="0"/>
+              <a:t>Message</a:t>
+            </a:r>
+          </a:p>
+          <a:p>
+            <a:pPr lvl="2"/>
+            <a:r>
+              <a:rPr lang="fr-CH" dirty="0" smtClean="0"/>
+              <a:t>#</a:t>
+            </a:r>
+            <a:r>
+              <a:rPr lang="fr-CH" dirty="0" err="1" smtClean="0"/>
+              <a:t>game</a:t>
+            </a:r>
+            <a:r>
+              <a:rPr lang="fr-CH" dirty="0" smtClean="0"/>
+              <a:t>#infos#</a:t>
+            </a:r>
+            <a:r>
+              <a:rPr lang="fr-CH" dirty="0" err="1" smtClean="0"/>
+              <a:t>message#b</a:t>
+            </a:r>
+            <a:r>
+              <a:rPr lang="fr-CH" dirty="0" smtClean="0"/>
+              <a:t> a touché a#</a:t>
+            </a:r>
+          </a:p>
+          <a:p>
+            <a:endParaRPr lang="fr-CH" dirty="0"/>
+          </a:p>
+        </p:txBody>
+      </p:sp>
+    </p:spTree>
+  </p:cSld>
+  <p:clrMapOvr>
+    <a:masterClrMapping/>
+  </p:clrMapOvr>
+  <p:transition>
+    <p:fade/>
+  </p:transition>
+</p:sld>
+</file>
+
+<file path=ppt/slides/slide18.xml><?xml version="1.0" encoding="utf-8"?>
+<p:sld xmlns:a="http://schemas.openxmlformats.org/drawingml/2006/main" xmlns:r="http://schemas.openxmlformats.org/officeDocument/2006/relationships" xmlns:p="http://schemas.openxmlformats.org/presentationml/2006/main">
+  <p:cSld>
+    <p:spTree>
+      <p:nvGrpSpPr>
+        <p:cNvPr id="1" name=""/>
+        <p:cNvGrpSpPr/>
+        <p:nvPr/>
+      </p:nvGrpSpPr>
+      <p:grpSpPr>
+        <a:xfrm>
+          <a:off x="0" y="0"/>
+          <a:ext cx="0" cy="0"/>
+          <a:chOff x="0" y="0"/>
+          <a:chExt cx="0" cy="0"/>
+        </a:xfrm>
+      </p:grpSpPr>
+      <p:sp>
+        <p:nvSpPr>
+          <p:cNvPr id="2" name="Titre 1"/>
+          <p:cNvSpPr>
+            <a:spLocks noGrp="1"/>
+          </p:cNvSpPr>
+          <p:nvPr>
+            <p:ph type="title"/>
+          </p:nvPr>
+        </p:nvSpPr>
+        <p:spPr/>
+        <p:txBody>
+          <a:bodyPr/>
+          <a:lstStyle/>
+          <a:p>
+            <a:r>
+              <a:rPr lang="fr-CH" dirty="0" smtClean="0"/>
+              <a:t>Démonstration</a:t>
+            </a:r>
+            <a:endParaRPr lang="fr-CH" dirty="0"/>
+          </a:p>
+        </p:txBody>
+      </p:sp>
+      <p:sp>
+        <p:nvSpPr>
+          <p:cNvPr id="3" name="Espace réservé du contenu 2"/>
+          <p:cNvSpPr>
+            <a:spLocks noGrp="1"/>
+          </p:cNvSpPr>
+          <p:nvPr>
+            <p:ph idx="1"/>
+          </p:nvPr>
+        </p:nvSpPr>
+        <p:spPr/>
+        <p:txBody>
+          <a:bodyPr/>
+          <a:lstStyle/>
+          <a:p>
+            <a:pPr>
+              <a:buNone/>
+            </a:pPr>
+            <a:endParaRPr lang="fr-CH" dirty="0"/>
+          </a:p>
+        </p:txBody>
+      </p:sp>
     </p:spTree>
   </p:cSld>
   <p:clrMapOvr>
@@ -5037,6 +6144,79 @@
       </p:par>
     </p:tnLst>
   </p:timing>
+</p:sld>
+</file>
+
+<file path=ppt/slides/slide19.xml><?xml version="1.0" encoding="utf-8"?>
+<p:sld xmlns:a="http://schemas.openxmlformats.org/drawingml/2006/main" xmlns:r="http://schemas.openxmlformats.org/officeDocument/2006/relationships" xmlns:p="http://schemas.openxmlformats.org/presentationml/2006/main">
+  <p:cSld>
+    <p:spTree>
+      <p:nvGrpSpPr>
+        <p:cNvPr id="1" name=""/>
+        <p:cNvGrpSpPr/>
+        <p:nvPr/>
+      </p:nvGrpSpPr>
+      <p:grpSpPr>
+        <a:xfrm>
+          <a:off x="0" y="0"/>
+          <a:ext cx="0" cy="0"/>
+          <a:chOff x="0" y="0"/>
+          <a:chExt cx="0" cy="0"/>
+        </a:xfrm>
+      </p:grpSpPr>
+      <p:sp>
+        <p:nvSpPr>
+          <p:cNvPr id="2" name="Titre 1"/>
+          <p:cNvSpPr>
+            <a:spLocks noGrp="1"/>
+          </p:cNvSpPr>
+          <p:nvPr>
+            <p:ph type="title"/>
+          </p:nvPr>
+        </p:nvSpPr>
+        <p:spPr/>
+        <p:txBody>
+          <a:bodyPr/>
+          <a:lstStyle/>
+          <a:p>
+            <a:r>
+              <a:rPr lang="fr-CH" dirty="0" smtClean="0"/>
+              <a:t>Améliorations</a:t>
+            </a:r>
+            <a:endParaRPr lang="fr-CH" dirty="0"/>
+          </a:p>
+        </p:txBody>
+      </p:sp>
+      <p:sp>
+        <p:nvSpPr>
+          <p:cNvPr id="3" name="Espace réservé du contenu 2"/>
+          <p:cNvSpPr>
+            <a:spLocks noGrp="1"/>
+          </p:cNvSpPr>
+          <p:nvPr>
+            <p:ph idx="1"/>
+          </p:nvPr>
+        </p:nvSpPr>
+        <p:spPr/>
+        <p:txBody>
+          <a:bodyPr/>
+          <a:lstStyle/>
+          <a:p>
+            <a:pPr>
+              <a:buNone/>
+            </a:pPr>
+            <a:endParaRPr lang="fr-CH" dirty="0" smtClean="0"/>
+          </a:p>
+        </p:txBody>
+      </p:sp>
+    </p:spTree>
+  </p:cSld>
+  <p:clrMapOvr>
+    <a:masterClrMapping/>
+  </p:clrMapOvr>
+  <p:transition>
+    <p:fade/>
+  </p:transition>
 </p:sld>
 </file>
 
@@ -5153,6 +6333,167 @@
           </a:p>
         </p:txBody>
       </p:sp>
+    </p:spTree>
+  </p:cSld>
+  <p:clrMapOvr>
+    <a:masterClrMapping/>
+  </p:clrMapOvr>
+  <p:transition>
+    <p:fade/>
+  </p:transition>
+  <p:timing>
+    <p:tnLst>
+      <p:par>
+        <p:cTn id="1" dur="indefinite" restart="never" nodeType="tmRoot"/>
+      </p:par>
+    </p:tnLst>
+  </p:timing>
+</p:sld>
+</file>
+
+<file path=ppt/slides/slide20.xml><?xml version="1.0" encoding="utf-8"?>
+<p:sld xmlns:a="http://schemas.openxmlformats.org/drawingml/2006/main" xmlns:r="http://schemas.openxmlformats.org/officeDocument/2006/relationships" xmlns:p="http://schemas.openxmlformats.org/presentationml/2006/main">
+  <p:cSld>
+    <p:spTree>
+      <p:nvGrpSpPr>
+        <p:cNvPr id="1" name=""/>
+        <p:cNvGrpSpPr/>
+        <p:nvPr/>
+      </p:nvGrpSpPr>
+      <p:grpSpPr>
+        <a:xfrm>
+          <a:off x="0" y="0"/>
+          <a:ext cx="0" cy="0"/>
+          <a:chOff x="0" y="0"/>
+          <a:chExt cx="0" cy="0"/>
+        </a:xfrm>
+      </p:grpSpPr>
+      <p:sp>
+        <p:nvSpPr>
+          <p:cNvPr id="2" name="Titre 1"/>
+          <p:cNvSpPr>
+            <a:spLocks noGrp="1"/>
+          </p:cNvSpPr>
+          <p:nvPr>
+            <p:ph type="title"/>
+          </p:nvPr>
+        </p:nvSpPr>
+        <p:spPr/>
+        <p:txBody>
+          <a:bodyPr/>
+          <a:lstStyle/>
+          <a:p>
+            <a:r>
+              <a:rPr lang="it-CH" dirty="0" smtClean="0"/>
+              <a:t>Conclusion</a:t>
+            </a:r>
+            <a:endParaRPr lang="it-CH" dirty="0"/>
+          </a:p>
+        </p:txBody>
+      </p:sp>
+      <p:sp>
+        <p:nvSpPr>
+          <p:cNvPr id="3" name="Espace réservé du contenu 2"/>
+          <p:cNvSpPr>
+            <a:spLocks noGrp="1"/>
+          </p:cNvSpPr>
+          <p:nvPr>
+            <p:ph idx="1"/>
+          </p:nvPr>
+        </p:nvSpPr>
+        <p:spPr/>
+        <p:txBody>
+          <a:bodyPr/>
+          <a:lstStyle/>
+          <a:p>
+            <a:r>
+              <a:rPr lang="it-CH" dirty="0" smtClean="0"/>
+              <a:t>Pas de mode par équipe</a:t>
+            </a:r>
+          </a:p>
+        </p:txBody>
+      </p:sp>
+    </p:spTree>
+  </p:cSld>
+  <p:clrMapOvr>
+    <a:masterClrMapping/>
+  </p:clrMapOvr>
+  <p:transition>
+    <p:fade/>
+  </p:transition>
+  <p:timing>
+    <p:tnLst>
+      <p:par>
+        <p:cTn id="1" dur="indefinite" restart="never" nodeType="tmRoot"/>
+      </p:par>
+    </p:tnLst>
+  </p:timing>
+</p:sld>
+</file>
+
+<file path=ppt/slides/slide21.xml><?xml version="1.0" encoding="utf-8"?>
+<p:sld xmlns:a="http://schemas.openxmlformats.org/drawingml/2006/main" xmlns:r="http://schemas.openxmlformats.org/officeDocument/2006/relationships" xmlns:p="http://schemas.openxmlformats.org/presentationml/2006/main">
+  <p:cSld>
+    <p:spTree>
+      <p:nvGrpSpPr>
+        <p:cNvPr id="1" name=""/>
+        <p:cNvGrpSpPr/>
+        <p:nvPr/>
+      </p:nvGrpSpPr>
+      <p:grpSpPr>
+        <a:xfrm>
+          <a:off x="0" y="0"/>
+          <a:ext cx="0" cy="0"/>
+          <a:chOff x="0" y="0"/>
+          <a:chExt cx="0" cy="0"/>
+        </a:xfrm>
+      </p:grpSpPr>
+      <p:sp>
+        <p:nvSpPr>
+          <p:cNvPr id="2" name="Titre 1"/>
+          <p:cNvSpPr>
+            <a:spLocks noGrp="1"/>
+          </p:cNvSpPr>
+          <p:nvPr>
+            <p:ph type="title"/>
+          </p:nvPr>
+        </p:nvSpPr>
+        <p:spPr/>
+        <p:txBody>
+          <a:bodyPr/>
+          <a:lstStyle/>
+          <a:p>
+            <a:r>
+              <a:rPr lang="it-CH" dirty="0" smtClean="0"/>
+              <a:t>Questions ?</a:t>
+            </a:r>
+            <a:endParaRPr lang="it-CH" dirty="0"/>
+          </a:p>
+        </p:txBody>
+      </p:sp>
+      <p:pic>
+        <p:nvPicPr>
+          <p:cNvPr id="4" name="Espace réservé du contenu 3" descr="domande-risposte.jpg"/>
+          <p:cNvPicPr>
+            <a:picLocks noGrp="1" noChangeAspect="1"/>
+          </p:cNvPicPr>
+          <p:nvPr>
+            <p:ph idx="1"/>
+          </p:nvPr>
+        </p:nvPicPr>
+        <p:blipFill>
+          <a:blip r:embed="rId2" cstate="print"/>
+          <a:stretch>
+            <a:fillRect/>
+          </a:stretch>
+        </p:blipFill>
+        <p:spPr>
+          <a:xfrm>
+            <a:off x="3279775" y="1987550"/>
+            <a:ext cx="3810000" cy="3721100"/>
+          </a:xfrm>
+        </p:spPr>
+      </p:pic>
     </p:spTree>
   </p:cSld>
   <p:clrMapOvr>
@@ -5234,11 +6575,7 @@
           <a:p>
             <a:r>
               <a:rPr lang="it-CH" dirty="0" smtClean="0"/>
-              <a:t>Jouable de 2 à 8 joueurs en </a:t>
-            </a:r>
-            <a:r>
-              <a:rPr lang="it-CH" dirty="0" smtClean="0"/>
-              <a:t>réseau</a:t>
+              <a:t>Jouable de 2 à 8 joueurs en réseau</a:t>
             </a:r>
           </a:p>
         </p:txBody>
@@ -5750,7 +7087,7 @@
       </p:grpSpPr>
       <p:pic>
         <p:nvPicPr>
-          <p:cNvPr id="1026" name="Picture 2" descr="D:\HEIG-VD\GEN\Labo\KillerBox\Conception\ClassDiagramServer.png"/>
+          <p:cNvPr id="2050" name="Picture 2" descr="D:\HEIG-VD\GEN\Labo\KillerBox\Conception\ClassDiagramServer.png"/>
           <p:cNvPicPr>
             <a:picLocks noChangeAspect="1" noChangeArrowheads="1"/>
           </p:cNvPicPr>
@@ -5765,8 +7102,8 @@
         </p:blipFill>
         <p:spPr bwMode="auto">
           <a:xfrm>
-            <a:off x="1000100" y="500042"/>
-            <a:ext cx="8143900" cy="5650386"/>
+            <a:off x="1000100" y="428604"/>
+            <a:ext cx="8043501" cy="5572164"/>
           </a:xfrm>
           <a:prstGeom prst="rect">
             <a:avLst/>

</xml_diff>

<commit_message>
Mis à jours diagramme de classe et présentation
</commit_message>
<xml_diff>
--- a/Documentation/presentation.pptx
+++ b/Documentation/presentation.pptx
@@ -4436,7 +4436,7 @@
           <a:p>
             <a:r>
               <a:rPr lang="fr-CH" dirty="0" smtClean="0"/>
-              <a:t>Plusieurs panels</a:t>
+              <a:t>Différents panels</a:t>
             </a:r>
           </a:p>
           <a:p>
@@ -4444,6 +4444,7 @@
               <a:rPr lang="it-CH" dirty="0" smtClean="0"/>
               <a:t>Packages</a:t>
             </a:r>
+            <a:endParaRPr lang="it-CH" dirty="0" smtClean="0"/>
           </a:p>
           <a:p>
             <a:pPr lvl="1"/>
@@ -4501,7 +4502,7 @@
       </p:grpSpPr>
       <p:pic>
         <p:nvPicPr>
-          <p:cNvPr id="1026" name="Picture 2" descr="D:\HEIG-VD\GEN\Labo\KillerBox\Conception\Client.png"/>
+          <p:cNvPr id="2" name="Picture 2" descr="D:\HEIG-VD\GEN\Labo\KillerBox\Conception\ClassDiagramClient.png"/>
           <p:cNvPicPr>
             <a:picLocks noChangeAspect="1" noChangeArrowheads="1"/>
           </p:cNvPicPr>
@@ -4516,8 +4517,8 @@
         </p:blipFill>
         <p:spPr bwMode="auto">
           <a:xfrm>
-            <a:off x="1020265" y="457656"/>
-            <a:ext cx="7980891" cy="5614549"/>
+            <a:off x="1043608" y="620688"/>
+            <a:ext cx="7973405" cy="5616624"/>
           </a:xfrm>
           <a:prstGeom prst="rect">
             <a:avLst/>
@@ -5290,15 +5291,7 @@
           <a:p>
             <a:r>
               <a:rPr lang="fr-CH" dirty="0" smtClean="0"/>
-              <a:t>Tout est calculé et </a:t>
-            </a:r>
-            <a:r>
-              <a:rPr lang="fr-CH" dirty="0" smtClean="0"/>
-              <a:t>contrôlé </a:t>
-            </a:r>
-            <a:r>
-              <a:rPr lang="fr-CH" dirty="0" smtClean="0"/>
-              <a:t>sur le client</a:t>
+              <a:t>Tout est calculé et contrôlé sur le client</a:t>
             </a:r>
           </a:p>
           <a:p>
@@ -5523,13 +5516,8 @@
             </a:pPr>
             <a:r>
               <a:rPr lang="fr-CH" dirty="0" smtClean="0"/>
-              <a:t>Indique que la partie </a:t>
-            </a:r>
-            <a:r>
-              <a:rPr lang="fr-CH" dirty="0" smtClean="0"/>
-              <a:t>commence !</a:t>
-            </a:r>
-            <a:endParaRPr lang="fr-CH" dirty="0" smtClean="0"/>
+              <a:t>Indique que la partie commence !</a:t>
+            </a:r>
           </a:p>
         </p:txBody>
       </p:sp>
@@ -5654,22 +5642,14 @@
             <a:pPr lvl="2"/>
             <a:r>
               <a:rPr lang="it-CH" dirty="0" smtClean="0"/>
-              <a:t>Dessine la zone de </a:t>
-            </a:r>
-            <a:r>
-              <a:rPr lang="it-CH" dirty="0" smtClean="0"/>
-              <a:t>jeu</a:t>
+              <a:t>Dessine la zone de jeu</a:t>
             </a:r>
             <a:br>
               <a:rPr lang="it-CH" dirty="0" smtClean="0"/>
             </a:br>
             <a:r>
               <a:rPr lang="it-CH" dirty="0" smtClean="0"/>
-              <a:t>(modèle</a:t>
-            </a:r>
-            <a:r>
-              <a:rPr lang="it-CH" dirty="0" smtClean="0"/>
-              <a:t>)</a:t>
+              <a:t>(modèle)</a:t>
             </a:r>
           </a:p>
           <a:p>
@@ -5840,13 +5820,8 @@
             <a:pPr lvl="1"/>
             <a:r>
               <a:rPr lang="fr-CH" dirty="0" smtClean="0"/>
-              <a:t>Télévision (PAL</a:t>
-            </a:r>
-            <a:r>
-              <a:rPr lang="fr-CH" dirty="0" smtClean="0"/>
-              <a:t>)</a:t>
-            </a:r>
-            <a:endParaRPr lang="fr-CH" dirty="0" smtClean="0"/>
+              <a:t>Télévision (PAL)</a:t>
+            </a:r>
           </a:p>
         </p:txBody>
       </p:sp>
@@ -6107,28 +6082,6 @@
           </a:p>
         </p:txBody>
       </p:sp>
-      <p:sp>
-        <p:nvSpPr>
-          <p:cNvPr id="3" name="Espace réservé du contenu 2"/>
-          <p:cNvSpPr>
-            <a:spLocks noGrp="1"/>
-          </p:cNvSpPr>
-          <p:nvPr>
-            <p:ph idx="1"/>
-          </p:nvPr>
-        </p:nvSpPr>
-        <p:spPr/>
-        <p:txBody>
-          <a:bodyPr/>
-          <a:lstStyle/>
-          <a:p>
-            <a:pPr>
-              <a:buNone/>
-            </a:pPr>
-            <a:endParaRPr lang="fr-CH" dirty="0"/>
-          </a:p>
-        </p:txBody>
-      </p:sp>
     </p:spTree>
   </p:cSld>
   <p:clrMapOvr>
@@ -6779,8 +6732,26 @@
             <a:pPr lvl="1"/>
             <a:r>
               <a:rPr lang="it-CH" dirty="0" smtClean="0"/>
-              <a:t>Par équipe</a:t>
-            </a:r>
+              <a:t>Par </a:t>
+            </a:r>
+            <a:r>
+              <a:rPr lang="it-CH" dirty="0" smtClean="0"/>
+              <a:t>équipe</a:t>
+            </a:r>
+          </a:p>
+          <a:p>
+            <a:r>
+              <a:rPr lang="it-CH" dirty="0" smtClean="0"/>
+              <a:t>But</a:t>
+            </a:r>
+          </a:p>
+          <a:p>
+            <a:pPr lvl="1"/>
+            <a:r>
+              <a:rPr lang="it-CH" dirty="0" smtClean="0"/>
+              <a:t>Eliminer ses adversaires</a:t>
+            </a:r>
+            <a:endParaRPr lang="it-CH" dirty="0" smtClean="0"/>
           </a:p>
           <a:p>
             <a:pPr lvl="1"/>
@@ -6859,36 +6830,69 @@
             <p:ph idx="1"/>
           </p:nvPr>
         </p:nvSpPr>
-        <p:spPr/>
+        <p:spPr>
+          <a:xfrm>
+            <a:off x="1435608" y="1447800"/>
+            <a:ext cx="7498080" cy="5221560"/>
+          </a:xfrm>
+        </p:spPr>
         <p:txBody>
           <a:bodyPr>
-            <a:normAutofit lnSpcReduction="10000"/>
+            <a:normAutofit fontScale="92500" lnSpcReduction="20000"/>
           </a:bodyPr>
           <a:lstStyle/>
           <a:p>
             <a:r>
               <a:rPr lang="fr-FR" dirty="0" smtClean="0"/>
-              <a:t>Architecture MVC</a:t>
-            </a:r>
-          </a:p>
-          <a:p>
+              <a:t>Architecture </a:t>
+            </a:r>
             <a:r>
               <a:rPr lang="fr-FR" dirty="0" smtClean="0"/>
-              <a:t>Modèle de serveur</a:t>
+              <a:t>MVC</a:t>
             </a:r>
           </a:p>
           <a:p>
             <a:r>
               <a:rPr lang="fr-FR" dirty="0" smtClean="0"/>
-              <a:t>Contrôleur</a:t>
+              <a:t>Serveur</a:t>
             </a:r>
           </a:p>
           <a:p>
             <a:pPr lvl="1"/>
             <a:r>
               <a:rPr lang="fr-FR" dirty="0" smtClean="0"/>
-              <a:t>Envoi d’informations aux clients</a:t>
-            </a:r>
+              <a:t>Informations</a:t>
+            </a:r>
+          </a:p>
+          <a:p>
+            <a:pPr lvl="1"/>
+            <a:r>
+              <a:rPr lang="fr-FR" dirty="0" smtClean="0"/>
+              <a:t>Changement d’état</a:t>
+            </a:r>
+            <a:endParaRPr lang="fr-FR" dirty="0" smtClean="0"/>
+          </a:p>
+          <a:p>
+            <a:r>
+              <a:rPr lang="fr-FR" dirty="0" smtClean="0"/>
+              <a:t>Contrôleurs</a:t>
+            </a:r>
+          </a:p>
+          <a:p>
+            <a:pPr lvl="1"/>
+            <a:r>
+              <a:rPr lang="fr-FR" dirty="0" smtClean="0"/>
+              <a:t>Un par client</a:t>
+            </a:r>
+            <a:endParaRPr lang="fr-FR" dirty="0" smtClean="0"/>
+          </a:p>
+          <a:p>
+            <a:pPr lvl="1"/>
+            <a:r>
+              <a:rPr lang="fr-FR" dirty="0" smtClean="0"/>
+              <a:t>Envoi d’informations</a:t>
+            </a:r>
+            <a:endParaRPr lang="fr-FR" dirty="0" smtClean="0"/>
           </a:p>
           <a:p>
             <a:r>
@@ -6913,14 +6917,15 @@
             <a:pPr lvl="1"/>
             <a:r>
               <a:rPr lang="it-CH" dirty="0" smtClean="0"/>
-              <a:t>Vue console</a:t>
-            </a:r>
+              <a:t>Console</a:t>
+            </a:r>
+            <a:endParaRPr lang="it-CH" dirty="0" smtClean="0"/>
           </a:p>
           <a:p>
             <a:pPr lvl="1"/>
             <a:r>
               <a:rPr lang="it-CH" dirty="0" smtClean="0"/>
-              <a:t>Vue graphique</a:t>
+              <a:t>Graphique</a:t>
             </a:r>
             <a:endParaRPr lang="fr-FR" dirty="0" smtClean="0"/>
           </a:p>
@@ -7188,8 +7193,16 @@
           <a:p>
             <a:r>
               <a:rPr lang="fr-CH" dirty="0" smtClean="0"/>
-              <a:t>Utilisation d’un modèle de client</a:t>
-            </a:r>
+              <a:t>Client</a:t>
+            </a:r>
+          </a:p>
+          <a:p>
+            <a:pPr lvl="1"/>
+            <a:r>
+              <a:rPr lang="fr-CH" dirty="0" smtClean="0"/>
+              <a:t>Informations de connexion (port, ip, …)</a:t>
+            </a:r>
+            <a:endParaRPr lang="fr-CH" dirty="0" smtClean="0"/>
           </a:p>
           <a:p>
             <a:r>
@@ -7216,6 +7229,13 @@
               <a:rPr lang="fr-CH" dirty="0" smtClean="0"/>
               <a:t>Protocole</a:t>
             </a:r>
+          </a:p>
+          <a:p>
+            <a:r>
+              <a:rPr lang="fr-CH" dirty="0" smtClean="0"/>
+              <a:t>Vue graphique</a:t>
+            </a:r>
+            <a:endParaRPr lang="fr-CH" dirty="0" smtClean="0"/>
           </a:p>
         </p:txBody>
       </p:sp>

</xml_diff>